<commit_message>
Adding Mac and Windows Icons
Added Mac and Windows icons for the Bevan font E
</commit_message>
<xml_diff>
--- a/Epix UI 4.0/icons/icons.pptx
+++ b/Epix UI 4.0/icons/icons.pptx
@@ -6,7 +6,8 @@
   </p:sldMasterIdLst>
   <p:sldIdLst>
     <p:sldId id="256" r:id="rId2"/>
-    <p:sldId id="257" r:id="rId3"/>
+    <p:sldId id="258" r:id="rId3"/>
+    <p:sldId id="257" r:id="rId4"/>
   </p:sldIdLst>
   <p:sldSz cx="12192000" cy="6858000"/>
   <p:notesSz cx="6858000" cy="9144000"/>
@@ -3049,6 +3050,122 @@
 </file>
 
 <file path=ppt/slides/slide2.xml><?xml version="1.0" encoding="utf-8"?>
+<p:sld xmlns:a="http://schemas.openxmlformats.org/drawingml/2006/main" xmlns:r="http://schemas.openxmlformats.org/officeDocument/2006/relationships" xmlns:p="http://schemas.openxmlformats.org/presentationml/2006/main">
+  <p:cSld>
+    <p:spTree>
+      <p:nvGrpSpPr>
+        <p:cNvPr id="1" name=""/>
+        <p:cNvGrpSpPr/>
+        <p:nvPr/>
+      </p:nvGrpSpPr>
+      <p:grpSpPr>
+        <a:xfrm>
+          <a:off x="0" y="0"/>
+          <a:ext cx="0" cy="0"/>
+          <a:chOff x="0" y="0"/>
+          <a:chExt cx="0" cy="0"/>
+        </a:xfrm>
+      </p:grpSpPr>
+      <p:sp>
+        <p:nvSpPr>
+          <p:cNvPr id="4" name="Hexagon 3"/>
+          <p:cNvSpPr/>
+          <p:nvPr/>
+        </p:nvSpPr>
+        <p:spPr>
+          <a:xfrm>
+            <a:off x="139279" y="93306"/>
+            <a:ext cx="7787540" cy="6713396"/>
+          </a:xfrm>
+          <a:prstGeom prst="hexagon">
+            <a:avLst/>
+          </a:prstGeom>
+          <a:solidFill>
+            <a:srgbClr val="2C2C2C"/>
+          </a:solidFill>
+          <a:ln>
+            <a:noFill/>
+          </a:ln>
+        </p:spPr>
+        <p:style>
+          <a:lnRef idx="2">
+            <a:schemeClr val="accent1">
+              <a:shade val="50000"/>
+            </a:schemeClr>
+          </a:lnRef>
+          <a:fillRef idx="1">
+            <a:schemeClr val="accent1"/>
+          </a:fillRef>
+          <a:effectRef idx="0">
+            <a:schemeClr val="accent1"/>
+          </a:effectRef>
+          <a:fontRef idx="minor">
+            <a:schemeClr val="lt1"/>
+          </a:fontRef>
+        </p:style>
+        <p:txBody>
+          <a:bodyPr rtlCol="0" anchor="ctr"/>
+          <a:lstStyle/>
+          <a:p>
+            <a:pPr algn="ctr"/>
+            <a:endParaRPr lang="en-US" sz="50000" dirty="0">
+              <a:solidFill>
+                <a:srgbClr val="00E3CC"/>
+              </a:solidFill>
+              <a:latin typeface="MT Extra" panose="05050102010205020202" pitchFamily="18" charset="2"/>
+            </a:endParaRPr>
+          </a:p>
+        </p:txBody>
+      </p:sp>
+      <p:sp>
+        <p:nvSpPr>
+          <p:cNvPr id="6" name="TextBox 5"/>
+          <p:cNvSpPr txBox="1"/>
+          <p:nvPr/>
+        </p:nvSpPr>
+        <p:spPr>
+          <a:xfrm>
+            <a:off x="71864" y="788082"/>
+            <a:ext cx="7922370" cy="7017306"/>
+          </a:xfrm>
+          <a:prstGeom prst="rect">
+            <a:avLst/>
+          </a:prstGeom>
+          <a:noFill/>
+        </p:spPr>
+        <p:txBody>
+          <a:bodyPr wrap="square" rtlCol="0">
+            <a:spAutoFit/>
+          </a:bodyPr>
+          <a:lstStyle/>
+          <a:p>
+            <a:pPr algn="ctr"/>
+            <a:r>
+              <a:rPr lang="en-US" sz="45000" dirty="0">
+                <a:solidFill>
+                  <a:srgbClr val="00E3CC"/>
+                </a:solidFill>
+                <a:latin typeface="Bevan" panose="02000000000000000000" pitchFamily="2" charset="0"/>
+              </a:rPr>
+              <a:t>E</a:t>
+            </a:r>
+          </a:p>
+        </p:txBody>
+      </p:sp>
+    </p:spTree>
+    <p:extLst>
+      <p:ext uri="{BB962C8B-B14F-4D97-AF65-F5344CB8AC3E}">
+        <p14:creationId xmlns:p14="http://schemas.microsoft.com/office/powerpoint/2010/main" val="3364942723"/>
+      </p:ext>
+    </p:extLst>
+  </p:cSld>
+  <p:clrMapOvr>
+    <a:masterClrMapping/>
+  </p:clrMapOvr>
+</p:sld>
+</file>
+
+<file path=ppt/slides/slide3.xml><?xml version="1.0" encoding="utf-8"?>
 <p:sld xmlns:a="http://schemas.openxmlformats.org/drawingml/2006/main" xmlns:r="http://schemas.openxmlformats.org/officeDocument/2006/relationships" xmlns:p="http://schemas.openxmlformats.org/presentationml/2006/main">
   <p:cSld>
     <p:spTree>

</xml_diff>